<commit_message>
update slides to include the demo
</commit_message>
<xml_diff>
--- a/Docker Intro.pptx
+++ b/Docker Intro.pptx
@@ -5,10 +5,10 @@
     <p:sldMasterId id="2147483648" r:id="rId1"/>
   </p:sldMasterIdLst>
   <p:notesMasterIdLst>
-    <p:notesMasterId r:id="rId27"/>
+    <p:notesMasterId r:id="rId31"/>
   </p:notesMasterIdLst>
   <p:handoutMasterIdLst>
-    <p:handoutMasterId r:id="rId28"/>
+    <p:handoutMasterId r:id="rId32"/>
   </p:handoutMasterIdLst>
   <p:sldIdLst>
     <p:sldId id="256" r:id="rId2"/>
@@ -26,16 +26,20 @@
     <p:sldId id="275" r:id="rId14"/>
     <p:sldId id="277" r:id="rId15"/>
     <p:sldId id="276" r:id="rId16"/>
-    <p:sldId id="269" r:id="rId17"/>
-    <p:sldId id="278" r:id="rId18"/>
-    <p:sldId id="270" r:id="rId19"/>
-    <p:sldId id="279" r:id="rId20"/>
-    <p:sldId id="281" r:id="rId21"/>
-    <p:sldId id="280" r:id="rId22"/>
-    <p:sldId id="268" r:id="rId23"/>
-    <p:sldId id="282" r:id="rId24"/>
-    <p:sldId id="283" r:id="rId25"/>
-    <p:sldId id="258" r:id="rId26"/>
+    <p:sldId id="285" r:id="rId17"/>
+    <p:sldId id="284" r:id="rId18"/>
+    <p:sldId id="287" r:id="rId19"/>
+    <p:sldId id="286" r:id="rId20"/>
+    <p:sldId id="269" r:id="rId21"/>
+    <p:sldId id="278" r:id="rId22"/>
+    <p:sldId id="270" r:id="rId23"/>
+    <p:sldId id="279" r:id="rId24"/>
+    <p:sldId id="281" r:id="rId25"/>
+    <p:sldId id="280" r:id="rId26"/>
+    <p:sldId id="268" r:id="rId27"/>
+    <p:sldId id="282" r:id="rId28"/>
+    <p:sldId id="283" r:id="rId29"/>
+    <p:sldId id="258" r:id="rId30"/>
   </p:sldIdLst>
   <p:sldSz cx="12192000" cy="6858000"/>
   <p:notesSz cx="6858000" cy="9144000"/>
@@ -5349,6 +5353,13 @@
   <p:clrMapOvr>
     <a:masterClrMapping/>
   </p:clrMapOvr>
+  <p:timing>
+    <p:tnLst>
+      <p:par>
+        <p:cTn id="1" dur="indefinite" restart="never" nodeType="tmRoot"/>
+      </p:par>
+    </p:tnLst>
+  </p:timing>
 </p:sld>
 </file>
 
@@ -5559,7 +5570,7 @@
           <a:p>
             <a:r>
               <a:rPr kumimoji="1" lang="zh-CN" altLang="en-US" dirty="0" smtClean="0"/>
-              <a:t>黑历史</a:t>
+              <a:t>使用</a:t>
             </a:r>
             <a:endParaRPr kumimoji="1" lang="zh-CN" altLang="en-US" dirty="0"/>
           </a:p>
@@ -5587,7 +5598,7 @@
     </p:spTree>
     <p:extLst>
       <p:ext uri="{BB962C8B-B14F-4D97-AF65-F5344CB8AC3E}">
-        <p14:creationId xmlns:p14="http://schemas.microsoft.com/office/powerpoint/2010/main" val="834681882"/>
+        <p14:creationId xmlns:p14="http://schemas.microsoft.com/office/powerpoint/2010/main" val="1758840933"/>
       </p:ext>
     </p:extLst>
   </p:cSld>
@@ -5623,7 +5634,7 @@
       </p:grpSpPr>
       <p:sp>
         <p:nvSpPr>
-          <p:cNvPr id="4" name="标题 3"/>
+          <p:cNvPr id="2" name="标题 1"/>
           <p:cNvSpPr>
             <a:spLocks noGrp="1"/>
           </p:cNvSpPr>
@@ -5638,7 +5649,7 @@
           <a:p>
             <a:r>
               <a:rPr kumimoji="1" lang="zh-CN" altLang="en-US" dirty="0" smtClean="0"/>
-              <a:t>内核支持</a:t>
+              <a:t>直接运行</a:t>
             </a:r>
             <a:endParaRPr kumimoji="1" lang="zh-CN" altLang="en-US" dirty="0"/>
           </a:p>
@@ -5646,7 +5657,7 @@
       </p:sp>
       <p:sp>
         <p:nvSpPr>
-          <p:cNvPr id="5" name="内容占位符 4"/>
+          <p:cNvPr id="3" name="内容占位符 2"/>
           <p:cNvSpPr>
             <a:spLocks noGrp="1"/>
           </p:cNvSpPr>
@@ -5660,87 +5671,81 @@
           <a:lstStyle/>
           <a:p>
             <a:r>
-              <a:rPr kumimoji="1" lang="zh-CN" altLang="en-US" dirty="0" smtClean="0"/>
-              <a:t>最低需要</a:t>
+              <a:rPr kumimoji="1" lang="en-US" altLang="zh-CN" dirty="0" err="1" smtClean="0"/>
+              <a:t>docker</a:t>
             </a:r>
             <a:r>
               <a:rPr kumimoji="1" lang="en-US" altLang="zh-CN" dirty="0" smtClean="0"/>
-              <a:t>3.10</a:t>
-            </a:r>
-            <a:r>
-              <a:rPr kumimoji="1" lang="zh-CN" altLang="en-US" dirty="0" smtClean="0"/>
-              <a:t>，所以</a:t>
+              <a:t> run </a:t>
+            </a:r>
+            <a:r>
+              <a:rPr kumimoji="1" lang="mr-IN" altLang="zh-CN" dirty="0" smtClean="0"/>
+              <a:t>–</a:t>
             </a:r>
             <a:r>
               <a:rPr kumimoji="1" lang="en-US" altLang="zh-CN" dirty="0" smtClean="0"/>
-              <a:t>RHEL</a:t>
-            </a:r>
-            <a:r>
-              <a:rPr kumimoji="1" lang="zh-CN" altLang="en-US" dirty="0" smtClean="0"/>
-              <a:t>需要</a:t>
+              <a:t>it &lt;image&gt; &lt;</a:t>
+            </a:r>
+            <a:r>
+              <a:rPr kumimoji="1" lang="en-US" altLang="zh-CN" dirty="0" err="1" smtClean="0"/>
+              <a:t>cmd</a:t>
             </a:r>
             <a:r>
               <a:rPr kumimoji="1" lang="en-US" altLang="zh-CN" dirty="0" smtClean="0"/>
-              <a:t>7</a:t>
-            </a:r>
-            <a:r>
-              <a:rPr kumimoji="1" lang="zh-CN" altLang="en-US" dirty="0" smtClean="0"/>
-              <a:t>以上</a:t>
+              <a:t>&gt;</a:t>
             </a:r>
             <a:endParaRPr kumimoji="1" lang="en-US" altLang="zh-CN" dirty="0"/>
           </a:p>
           <a:p>
             <a:r>
               <a:rPr kumimoji="1" lang="zh-CN" altLang="en-US" dirty="0" smtClean="0"/>
-              <a:t>但是</a:t>
-            </a:r>
-            <a:r>
-              <a:rPr kumimoji="1" lang="en-US" altLang="zh-CN" dirty="0" smtClean="0"/>
-              <a:t>RHEL</a:t>
-            </a:r>
-            <a:r>
-              <a:rPr kumimoji="1" lang="zh-CN" altLang="en-US" dirty="0" smtClean="0"/>
-              <a:t>系列做了</a:t>
-            </a:r>
-            <a:r>
-              <a:rPr kumimoji="1" lang="en-US" altLang="zh-CN" dirty="0" smtClean="0"/>
-              <a:t>backport</a:t>
-            </a:r>
-            <a:r>
-              <a:rPr kumimoji="1" lang="zh-CN" altLang="en-US" dirty="0" smtClean="0"/>
-              <a:t>，</a:t>
-            </a:r>
-            <a:r>
-              <a:rPr kumimoji="1" lang="en-US" altLang="zh-CN" dirty="0" smtClean="0"/>
-              <a:t>RHEL6</a:t>
-            </a:r>
-            <a:r>
-              <a:rPr kumimoji="1" lang="zh-CN" altLang="en-US" dirty="0" smtClean="0"/>
-              <a:t>也可以使用</a:t>
+              <a:t>把</a:t>
             </a:r>
             <a:r>
               <a:rPr kumimoji="1" lang="en-US" altLang="zh-CN" dirty="0" smtClean="0"/>
               <a:t>Docker</a:t>
             </a:r>
-          </a:p>
-          <a:p>
+            <a:r>
+              <a:rPr kumimoji="1" lang="zh-CN" altLang="en-US" dirty="0" smtClean="0"/>
+              <a:t>当虚拟</a:t>
+            </a:r>
+            <a:r>
+              <a:rPr kumimoji="1" lang="zh-CN" altLang="en-US" dirty="0" smtClean="0"/>
+              <a:t>机用</a:t>
+            </a:r>
             <a:endParaRPr kumimoji="1" lang="en-US" altLang="zh-CN" dirty="0" smtClean="0"/>
           </a:p>
           <a:p>
-            <a:endParaRPr kumimoji="1" lang="zh-CN" altLang="en-US" dirty="0"/>
+            <a:r>
+              <a:rPr kumimoji="1" lang="en-US" altLang="zh-CN" dirty="0" smtClean="0">
+                <a:hlinkClick r:id="rId2"/>
+              </a:rPr>
+              <a:t>demo</a:t>
+            </a:r>
+            <a:endParaRPr kumimoji="1" lang="en-US" altLang="zh-CN" dirty="0" smtClean="0"/>
+          </a:p>
+          <a:p>
+            <a:endParaRPr kumimoji="1" lang="en-US" altLang="zh-CN" dirty="0" smtClean="0"/>
           </a:p>
         </p:txBody>
       </p:sp>
     </p:spTree>
     <p:extLst>
       <p:ext uri="{BB962C8B-B14F-4D97-AF65-F5344CB8AC3E}">
-        <p14:creationId xmlns:p14="http://schemas.microsoft.com/office/powerpoint/2010/main" val="927064857"/>
+        <p14:creationId xmlns:p14="http://schemas.microsoft.com/office/powerpoint/2010/main" val="104367555"/>
       </p:ext>
     </p:extLst>
   </p:cSld>
   <p:clrMapOvr>
     <a:masterClrMapping/>
   </p:clrMapOvr>
+  <p:timing>
+    <p:tnLst>
+      <p:par>
+        <p:cTn id="1" dur="indefinite" restart="never" nodeType="tmRoot"/>
+      </p:par>
+    </p:tnLst>
+  </p:timing>
 </p:sld>
 </file>
 
@@ -5777,113 +5782,59 @@
           <a:lstStyle/>
           <a:p>
             <a:r>
+              <a:rPr kumimoji="1" lang="zh-CN" altLang="en-US" dirty="0" smtClean="0"/>
+              <a:t>创建镜像</a:t>
+            </a:r>
+            <a:endParaRPr kumimoji="1" lang="zh-CN" altLang="en-US" dirty="0"/>
+          </a:p>
+        </p:txBody>
+      </p:sp>
+      <p:sp>
+        <p:nvSpPr>
+          <p:cNvPr id="3" name="内容占位符 2"/>
+          <p:cNvSpPr>
+            <a:spLocks noGrp="1"/>
+          </p:cNvSpPr>
+          <p:nvPr>
+            <p:ph idx="1"/>
+          </p:nvPr>
+        </p:nvSpPr>
+        <p:spPr/>
+        <p:txBody>
+          <a:bodyPr/>
+          <a:lstStyle/>
+          <a:p>
+            <a:r>
+              <a:rPr kumimoji="1" lang="zh-CN" altLang="en-US" dirty="0" smtClean="0"/>
+              <a:t>写</a:t>
+            </a:r>
+            <a:r>
+              <a:rPr kumimoji="1" lang="en-US" altLang="zh-CN" dirty="0" err="1" smtClean="0"/>
+              <a:t>Dockerfile</a:t>
+            </a:r>
+            <a:endParaRPr kumimoji="1" lang="en-US" altLang="zh-CN" dirty="0" smtClean="0"/>
+          </a:p>
+          <a:p>
+            <a:r>
+              <a:rPr kumimoji="1" lang="en-US" altLang="zh-CN" dirty="0" err="1" smtClean="0"/>
+              <a:t>docker</a:t>
+            </a:r>
+            <a:r>
               <a:rPr kumimoji="1" lang="en-US" altLang="zh-CN" dirty="0" smtClean="0"/>
-              <a:t>Storage Driver</a:t>
-            </a:r>
-            <a:endParaRPr kumimoji="1" lang="zh-CN" altLang="en-US" dirty="0"/>
-          </a:p>
-        </p:txBody>
-      </p:sp>
-      <p:sp>
-        <p:nvSpPr>
-          <p:cNvPr id="3" name="内容占位符 2"/>
-          <p:cNvSpPr>
-            <a:spLocks noGrp="1"/>
-          </p:cNvSpPr>
-          <p:nvPr>
-            <p:ph idx="1"/>
-          </p:nvPr>
-        </p:nvSpPr>
-        <p:spPr/>
-        <p:txBody>
-          <a:bodyPr/>
-          <a:lstStyle/>
-          <a:p>
+              <a:t> build -t &lt;name&gt;[:&lt;tag&gt;] &lt;path</a:t>
+            </a:r>
             <a:r>
               <a:rPr kumimoji="1" lang="en-US" altLang="zh-CN" dirty="0" smtClean="0"/>
-              <a:t>AUFS</a:t>
-            </a:r>
-            <a:r>
-              <a:rPr kumimoji="1" lang="zh-CN" altLang="en-US" dirty="0" smtClean="0"/>
-              <a:t>不稳定，在</a:t>
-            </a:r>
-            <a:r>
-              <a:rPr kumimoji="1" lang="en-US" altLang="zh-CN" dirty="0" smtClean="0"/>
-              <a:t>3.x</a:t>
-            </a:r>
-            <a:r>
-              <a:rPr kumimoji="1" lang="zh-CN" altLang="en-US" dirty="0" smtClean="0"/>
-              <a:t>内核中经常挂掉，且每个版本症状都不太一样。而</a:t>
-            </a:r>
-            <a:r>
-              <a:rPr kumimoji="1" lang="en-US" altLang="zh-CN" dirty="0" smtClean="0"/>
-              <a:t>4.x</a:t>
-            </a:r>
-            <a:r>
-              <a:rPr kumimoji="1" lang="zh-CN" altLang="en-US" dirty="0" smtClean="0"/>
-              <a:t>内核</a:t>
-            </a:r>
-            <a:r>
-              <a:rPr kumimoji="1" lang="zh-CN" altLang="en-US" dirty="0" smtClean="0"/>
-              <a:t>不再支持</a:t>
-            </a:r>
-            <a:r>
-              <a:rPr kumimoji="1" lang="en-US" altLang="zh-CN" dirty="0" smtClean="0"/>
-              <a:t>AUFS</a:t>
-            </a:r>
-            <a:r>
-              <a:rPr kumimoji="1" lang="zh-CN" altLang="en-US" dirty="0" smtClean="0"/>
-              <a:t>（大写的尴尬</a:t>
-            </a:r>
-            <a:endParaRPr kumimoji="1" lang="en-US" altLang="zh-CN" dirty="0" smtClean="0"/>
-          </a:p>
-          <a:p>
-            <a:r>
-              <a:rPr kumimoji="1" lang="en-US" altLang="zh-CN" dirty="0" err="1" smtClean="0"/>
-              <a:t>OverlayFS</a:t>
-            </a:r>
-            <a:r>
-              <a:rPr kumimoji="1" lang="zh-CN" altLang="en-US" dirty="0" smtClean="0"/>
-              <a:t>夭折</a:t>
-            </a:r>
-            <a:endParaRPr kumimoji="1" lang="en-US" altLang="zh-CN" dirty="0" smtClean="0"/>
-          </a:p>
-          <a:p>
-            <a:r>
-              <a:rPr kumimoji="1" lang="en-US" altLang="zh-CN" dirty="0" smtClean="0"/>
-              <a:t>Overlay2</a:t>
-            </a:r>
-            <a:r>
-              <a:rPr kumimoji="1" lang="zh-CN" altLang="en-US" dirty="0" smtClean="0"/>
-              <a:t>尚不成熟，</a:t>
-            </a:r>
-            <a:r>
-              <a:rPr kumimoji="1" lang="en-US" altLang="zh-CN" dirty="0" smtClean="0"/>
-              <a:t>4.x</a:t>
-            </a:r>
-            <a:r>
-              <a:rPr kumimoji="1" lang="zh-CN" altLang="en-US" dirty="0" smtClean="0"/>
-              <a:t>内核没有广泛使用</a:t>
-            </a:r>
-            <a:endParaRPr kumimoji="1" lang="en-US" altLang="zh-CN" dirty="0" smtClean="0"/>
-          </a:p>
-          <a:p>
-            <a:r>
-              <a:rPr kumimoji="1" lang="zh-CN" altLang="en-US" dirty="0" smtClean="0"/>
-              <a:t>挑选存储驱动很纠结，官方建议</a:t>
-            </a:r>
-            <a:r>
-              <a:rPr kumimoji="1" lang="zh-CN" altLang="en-US" dirty="0" smtClean="0">
+              <a:t>&gt;</a:t>
+            </a:r>
+          </a:p>
+          <a:p>
+            <a:r>
+              <a:rPr kumimoji="1" lang="en-US" altLang="zh-CN" dirty="0" smtClean="0">
                 <a:hlinkClick r:id="rId2"/>
               </a:rPr>
-              <a:t>查表</a:t>
-            </a:r>
-            <a:endParaRPr kumimoji="1" lang="en-US" altLang="zh-CN" dirty="0" smtClean="0"/>
-          </a:p>
-          <a:p>
-            <a:endParaRPr kumimoji="1" lang="en-US" altLang="zh-CN" dirty="0" smtClean="0"/>
-          </a:p>
-          <a:p>
+              <a:t>demo</a:t>
+            </a:r>
             <a:endParaRPr kumimoji="1" lang="zh-CN" altLang="en-US" dirty="0"/>
           </a:p>
         </p:txBody>
@@ -5891,7 +5842,7 @@
     </p:spTree>
     <p:extLst>
       <p:ext uri="{BB962C8B-B14F-4D97-AF65-F5344CB8AC3E}">
-        <p14:creationId xmlns:p14="http://schemas.microsoft.com/office/powerpoint/2010/main" val="641855112"/>
+        <p14:creationId xmlns:p14="http://schemas.microsoft.com/office/powerpoint/2010/main" val="27220752"/>
       </p:ext>
     </p:extLst>
   </p:cSld>
@@ -5942,7 +5893,19 @@
           <a:p>
             <a:r>
               <a:rPr kumimoji="1" lang="zh-CN" altLang="en-US" dirty="0" smtClean="0"/>
-              <a:t>反复改名</a:t>
+              <a:t>使用</a:t>
+            </a:r>
+            <a:r>
+              <a:rPr kumimoji="1" lang="en-US" altLang="zh-CN" dirty="0" smtClean="0"/>
+              <a:t>Docker</a:t>
+            </a:r>
+            <a:r>
+              <a:rPr kumimoji="1" lang="zh-CN" altLang="en-US" dirty="0" smtClean="0"/>
+              <a:t> </a:t>
+            </a:r>
+            <a:r>
+              <a:rPr kumimoji="1" lang="en-US" altLang="zh-CN" dirty="0" smtClean="0"/>
+              <a:t>Compose</a:t>
             </a:r>
             <a:endParaRPr kumimoji="1" lang="zh-CN" altLang="en-US" dirty="0"/>
           </a:p>
@@ -5964,87 +5927,53 @@
           <a:lstStyle/>
           <a:p>
             <a:r>
-              <a:rPr kumimoji="1" lang="en-US" altLang="zh-CN" dirty="0" smtClean="0"/>
-              <a:t>2015</a:t>
-            </a:r>
-            <a:r>
-              <a:rPr kumimoji="1" lang="zh-CN" altLang="en-US" dirty="0" smtClean="0"/>
-              <a:t>年，</a:t>
-            </a:r>
-            <a:r>
-              <a:rPr kumimoji="1" lang="en-US" altLang="zh-CN" dirty="0" err="1" smtClean="0"/>
-              <a:t>docker.io</a:t>
-            </a:r>
-            <a:r>
-              <a:rPr kumimoji="1" lang="en-US" altLang="zh-CN" dirty="0" smtClean="0"/>
-              <a:t> </a:t>
-            </a:r>
-            <a:r>
-              <a:rPr kumimoji="1" lang="zh-CN" altLang="en-US" dirty="0" smtClean="0"/>
-              <a:t>改名</a:t>
-            </a:r>
-            <a:r>
-              <a:rPr kumimoji="1" lang="en-US" altLang="zh-CN" dirty="0" smtClean="0"/>
-              <a:t> </a:t>
+              <a:rPr kumimoji="1" lang="zh-CN" altLang="en-US" dirty="0" smtClean="0"/>
+              <a:t>一键管理</a:t>
+            </a:r>
+            <a:r>
+              <a:rPr kumimoji="1" lang="zh-CN" altLang="en-US" dirty="0" smtClean="0"/>
+              <a:t>多个</a:t>
             </a:r>
             <a:r>
               <a:rPr kumimoji="1" lang="en-US" altLang="zh-CN" dirty="0" err="1" smtClean="0"/>
               <a:t>docker</a:t>
             </a:r>
             <a:r>
+              <a:rPr kumimoji="1" lang="zh-CN" altLang="en-US" dirty="0" smtClean="0"/>
+              <a:t>容器</a:t>
+            </a:r>
+            <a:endParaRPr kumimoji="1" lang="en-US" altLang="zh-CN" dirty="0" smtClean="0"/>
+          </a:p>
+          <a:p>
+            <a:r>
+              <a:rPr kumimoji="1" lang="en-US" altLang="zh-CN" dirty="0" smtClean="0">
+                <a:hlinkClick r:id="rId2"/>
+              </a:rPr>
+              <a:t>demo</a:t>
+            </a:r>
+            <a:r>
+              <a:rPr kumimoji="1" lang="zh-CN" altLang="en-US" dirty="0" smtClean="0">
+                <a:hlinkClick r:id="rId2"/>
+              </a:rPr>
+              <a:t> </a:t>
+            </a:r>
+            <a:r>
+              <a:rPr kumimoji="1" lang="en-US" altLang="zh-CN" dirty="0" smtClean="0">
+                <a:hlinkClick r:id="rId2"/>
+              </a:rPr>
+              <a:t>0</a:t>
+            </a:r>
+            <a:r>
               <a:rPr kumimoji="1" lang="en-US" altLang="zh-CN" dirty="0" smtClean="0"/>
-              <a:t>-engine,</a:t>
-            </a:r>
-            <a:r>
-              <a:rPr kumimoji="1" lang="zh-CN" altLang="en-US" dirty="0" smtClean="0"/>
-              <a:t>从</a:t>
-            </a:r>
-            <a:r>
-              <a:rPr kumimoji="1" lang="en-US" altLang="zh-CN" dirty="0" err="1" smtClean="0"/>
-              <a:t>Debian</a:t>
-            </a:r>
-            <a:r>
-              <a:rPr kumimoji="1" lang="zh-CN" altLang="en-US" dirty="0" smtClean="0"/>
-              <a:t>官方源中移除（然后自己搭了一套）</a:t>
-            </a:r>
-            <a:endParaRPr kumimoji="1" lang="en-US" altLang="zh-CN" dirty="0" smtClean="0"/>
-          </a:p>
-          <a:p>
-            <a:r>
-              <a:rPr kumimoji="1" lang="en-US" altLang="zh-CN" dirty="0" smtClean="0"/>
-              <a:t>2017</a:t>
-            </a:r>
-            <a:r>
-              <a:rPr kumimoji="1" lang="zh-CN" altLang="en-US" dirty="0" smtClean="0"/>
-              <a:t>年</a:t>
-            </a:r>
-            <a:r>
-              <a:rPr kumimoji="1" lang="en-US" altLang="zh-CN" dirty="0" smtClean="0"/>
-              <a:t>2</a:t>
-            </a:r>
-            <a:r>
-              <a:rPr kumimoji="1" lang="zh-CN" altLang="en-US" dirty="0" smtClean="0"/>
-              <a:t>月，</a:t>
-            </a:r>
-            <a:r>
-              <a:rPr kumimoji="1" lang="en-US" altLang="zh-CN" dirty="0" err="1" smtClean="0"/>
-              <a:t>docker</a:t>
-            </a:r>
-            <a:r>
-              <a:rPr kumimoji="1" lang="en-US" altLang="zh-CN" dirty="0" smtClean="0"/>
-              <a:t>-engine</a:t>
-            </a:r>
-            <a:r>
-              <a:rPr kumimoji="1" lang="zh-CN" altLang="en-US" dirty="0" smtClean="0"/>
-              <a:t>改名</a:t>
-            </a:r>
-            <a:r>
-              <a:rPr kumimoji="1" lang="en-US" altLang="zh-CN" dirty="0" err="1" smtClean="0"/>
-              <a:t>docker-ce</a:t>
-            </a:r>
-            <a:r>
-              <a:rPr kumimoji="1" lang="zh-CN" altLang="en-US" dirty="0" smtClean="0"/>
-              <a:t>，目前还处于两个名字都可以用的状态</a:t>
+              <a:t> (official)</a:t>
+            </a:r>
+          </a:p>
+          <a:p>
+            <a:r>
+              <a:rPr kumimoji="1" lang="en-US" altLang="zh-CN" dirty="0" smtClean="0">
+                <a:hlinkClick r:id="rId3"/>
+              </a:rPr>
+              <a:t>demo 1</a:t>
             </a:r>
             <a:endParaRPr kumimoji="1" lang="zh-CN" altLang="en-US" dirty="0"/>
           </a:p>
@@ -6053,13 +5982,20 @@
     </p:spTree>
     <p:extLst>
       <p:ext uri="{BB962C8B-B14F-4D97-AF65-F5344CB8AC3E}">
-        <p14:creationId xmlns:p14="http://schemas.microsoft.com/office/powerpoint/2010/main" val="60597055"/>
+        <p14:creationId xmlns:p14="http://schemas.microsoft.com/office/powerpoint/2010/main" val="736616729"/>
       </p:ext>
     </p:extLst>
   </p:cSld>
   <p:clrMapOvr>
     <a:masterClrMapping/>
   </p:clrMapOvr>
+  <p:timing>
+    <p:tnLst>
+      <p:par>
+        <p:cTn id="1" dur="indefinite" restart="never" nodeType="tmRoot"/>
+      </p:par>
+    </p:tnLst>
+  </p:timing>
 </p:sld>
 </file>
 
@@ -6233,16 +6169,8 @@
           <a:lstStyle/>
           <a:p>
             <a:r>
-              <a:rPr kumimoji="1" lang="en-US" altLang="zh-CN" dirty="0" smtClean="0"/>
-              <a:t>Release</a:t>
-            </a:r>
-            <a:r>
-              <a:rPr kumimoji="1" lang="zh-CN" altLang="en-US" dirty="0" smtClean="0"/>
-              <a:t> </a:t>
-            </a:r>
-            <a:r>
-              <a:rPr kumimoji="1" lang="en-US" altLang="zh-CN" dirty="0" smtClean="0"/>
-              <a:t>Cycle</a:t>
+              <a:rPr kumimoji="1" lang="zh-CN" altLang="en-US" dirty="0" smtClean="0"/>
+              <a:t>黑历史</a:t>
             </a:r>
             <a:endParaRPr kumimoji="1" lang="zh-CN" altLang="en-US" dirty="0"/>
           </a:p>
@@ -6250,12 +6178,12 @@
       </p:sp>
       <p:sp>
         <p:nvSpPr>
-          <p:cNvPr id="3" name="内容占位符 2"/>
-          <p:cNvSpPr>
-            <a:spLocks noGrp="1"/>
-          </p:cNvSpPr>
-          <p:nvPr>
-            <p:ph idx="1"/>
+          <p:cNvPr id="3" name="文本占位符 2"/>
+          <p:cNvSpPr>
+            <a:spLocks noGrp="1"/>
+          </p:cNvSpPr>
+          <p:nvPr>
+            <p:ph type="body" idx="1"/>
           </p:nvPr>
         </p:nvSpPr>
         <p:spPr/>
@@ -6263,101 +6191,27 @@
           <a:bodyPr/>
           <a:lstStyle/>
           <a:p>
-            <a:r>
-              <a:rPr kumimoji="1" lang="zh-CN" altLang="en-US" dirty="0" smtClean="0"/>
-              <a:t>早期</a:t>
-            </a:r>
-            <a:r>
-              <a:rPr kumimoji="1" lang="en-US" altLang="zh-CN" dirty="0" smtClean="0"/>
-              <a:t>Docker</a:t>
-            </a:r>
-            <a:r>
-              <a:rPr kumimoji="1" lang="zh-CN" altLang="en-US" dirty="0" smtClean="0"/>
-              <a:t>迭代迅速，没有</a:t>
-            </a:r>
-            <a:r>
-              <a:rPr kumimoji="1" lang="en-US" altLang="zh-CN" dirty="0" smtClean="0"/>
-              <a:t>LTS</a:t>
-            </a:r>
-            <a:r>
-              <a:rPr kumimoji="1" lang="zh-CN" altLang="en-US" dirty="0" smtClean="0"/>
-              <a:t>，单个版本的生命周期很短</a:t>
-            </a:r>
-            <a:endParaRPr kumimoji="1" lang="en-US" altLang="zh-CN" dirty="0" smtClean="0"/>
-          </a:p>
-          <a:p>
-            <a:r>
-              <a:rPr kumimoji="1" lang="en-US" altLang="zh-CN" dirty="0"/>
-              <a:t>2017</a:t>
-            </a:r>
-            <a:r>
-              <a:rPr kumimoji="1" lang="zh-CN" altLang="en-US" dirty="0"/>
-              <a:t>年</a:t>
-            </a:r>
-            <a:r>
-              <a:rPr kumimoji="1" lang="en-US" altLang="zh-CN" dirty="0"/>
-              <a:t>2</a:t>
-            </a:r>
-            <a:r>
-              <a:rPr kumimoji="1" lang="zh-CN" altLang="en-US" dirty="0"/>
-              <a:t>月，</a:t>
-            </a:r>
-            <a:r>
-              <a:rPr kumimoji="1" lang="en-US" altLang="zh-CN" dirty="0"/>
-              <a:t>Docker</a:t>
-            </a:r>
-            <a:r>
-              <a:rPr kumimoji="1" lang="zh-CN" altLang="en-US" dirty="0"/>
-              <a:t>发布了企业版（</a:t>
-            </a:r>
-            <a:r>
-              <a:rPr kumimoji="1" lang="en-US" altLang="zh-CN" dirty="0">
-                <a:hlinkClick r:id="rId2"/>
-              </a:rPr>
-              <a:t>ANNOUNCING DOCKER ENTERPRISE EDITION</a:t>
-            </a:r>
-            <a:r>
-              <a:rPr kumimoji="1" lang="zh-CN" altLang="en-US" dirty="0" smtClean="0"/>
-              <a:t>）</a:t>
-            </a:r>
-            <a:r>
-              <a:rPr kumimoji="1" lang="zh-CN" altLang="en-US" b="1" dirty="0" smtClean="0"/>
-              <a:t>可能</a:t>
-            </a:r>
-            <a:r>
-              <a:rPr kumimoji="1" lang="zh-CN" altLang="en-US" dirty="0" smtClean="0"/>
-              <a:t>会改变</a:t>
-            </a:r>
-            <a:r>
-              <a:rPr kumimoji="1" lang="en-US" altLang="zh-CN" dirty="0" smtClean="0"/>
-              <a:t>Release</a:t>
-            </a:r>
-            <a:r>
-              <a:rPr kumimoji="1" lang="zh-CN" altLang="en-US" dirty="0" smtClean="0"/>
-              <a:t> </a:t>
-            </a:r>
-            <a:r>
-              <a:rPr kumimoji="1" lang="en-US" altLang="zh-CN" dirty="0" smtClean="0"/>
-              <a:t>Cycle</a:t>
-            </a:r>
-            <a:r>
-              <a:rPr kumimoji="1" lang="zh-CN" altLang="en-US" dirty="0" smtClean="0"/>
-              <a:t>混乱的问题</a:t>
-            </a:r>
-            <a:endParaRPr kumimoji="1" lang="zh-CN" altLang="en-US" dirty="0"/>
+            <a:endParaRPr kumimoji="1" lang="zh-CN" altLang="en-US"/>
           </a:p>
         </p:txBody>
       </p:sp>
     </p:spTree>
     <p:extLst>
       <p:ext uri="{BB962C8B-B14F-4D97-AF65-F5344CB8AC3E}">
-        <p14:creationId xmlns:p14="http://schemas.microsoft.com/office/powerpoint/2010/main" val="1341296058"/>
+        <p14:creationId xmlns:p14="http://schemas.microsoft.com/office/powerpoint/2010/main" val="834681882"/>
       </p:ext>
     </p:extLst>
   </p:cSld>
   <p:clrMapOvr>
     <a:masterClrMapping/>
   </p:clrMapOvr>
+  <p:timing>
+    <p:tnLst>
+      <p:par>
+        <p:cTn id="1" dur="indefinite" restart="never" nodeType="tmRoot"/>
+      </p:par>
+    </p:tnLst>
+  </p:timing>
 </p:sld>
 </file>
 
@@ -6380,7 +6234,7 @@
       </p:grpSpPr>
       <p:sp>
         <p:nvSpPr>
-          <p:cNvPr id="2" name="标题 1"/>
+          <p:cNvPr id="4" name="标题 3"/>
           <p:cNvSpPr>
             <a:spLocks noGrp="1"/>
           </p:cNvSpPr>
@@ -6395,7 +6249,7 @@
           <a:p>
             <a:r>
               <a:rPr kumimoji="1" lang="zh-CN" altLang="en-US" dirty="0" smtClean="0"/>
-              <a:t>不稳定</a:t>
+              <a:t>内核支持</a:t>
             </a:r>
             <a:endParaRPr kumimoji="1" lang="zh-CN" altLang="en-US" dirty="0"/>
           </a:p>
@@ -6403,7 +6257,7 @@
       </p:sp>
       <p:sp>
         <p:nvSpPr>
-          <p:cNvPr id="3" name="内容占位符 2"/>
+          <p:cNvPr id="5" name="内容占位符 4"/>
           <p:cNvSpPr>
             <a:spLocks noGrp="1"/>
           </p:cNvSpPr>
@@ -6417,43 +6271,73 @@
           <a:lstStyle/>
           <a:p>
             <a:r>
+              <a:rPr kumimoji="1" lang="zh-CN" altLang="en-US" dirty="0" smtClean="0"/>
+              <a:t>最低需要</a:t>
+            </a:r>
+            <a:r>
               <a:rPr kumimoji="1" lang="en-US" altLang="zh-CN" dirty="0" smtClean="0"/>
-              <a:t>Container</a:t>
-            </a:r>
-            <a:r>
-              <a:rPr kumimoji="1" lang="zh-CN" altLang="en-US" dirty="0" smtClean="0"/>
-              <a:t>会挂</a:t>
-            </a:r>
+              <a:t>3.10</a:t>
+            </a:r>
+            <a:r>
+              <a:rPr kumimoji="1" lang="zh-CN" altLang="en-US" dirty="0" smtClean="0"/>
+              <a:t>，所以</a:t>
+            </a:r>
+            <a:r>
+              <a:rPr kumimoji="1" lang="en-US" altLang="zh-CN" dirty="0" smtClean="0"/>
+              <a:t>RHEL</a:t>
+            </a:r>
+            <a:r>
+              <a:rPr kumimoji="1" lang="zh-CN" altLang="en-US" dirty="0" smtClean="0"/>
+              <a:t>需要</a:t>
+            </a:r>
+            <a:r>
+              <a:rPr kumimoji="1" lang="en-US" altLang="zh-CN" dirty="0" smtClean="0"/>
+              <a:t>7</a:t>
+            </a:r>
+            <a:r>
+              <a:rPr kumimoji="1" lang="zh-CN" altLang="en-US" dirty="0" smtClean="0"/>
+              <a:t>以上</a:t>
+            </a:r>
+            <a:endParaRPr kumimoji="1" lang="en-US" altLang="zh-CN" dirty="0"/>
+          </a:p>
+          <a:p>
+            <a:r>
+              <a:rPr kumimoji="1" lang="zh-CN" altLang="en-US" dirty="0" smtClean="0"/>
+              <a:t>但是</a:t>
+            </a:r>
+            <a:r>
+              <a:rPr kumimoji="1" lang="en-US" altLang="zh-CN" dirty="0" smtClean="0"/>
+              <a:t>RHEL</a:t>
+            </a:r>
+            <a:r>
+              <a:rPr kumimoji="1" lang="zh-CN" altLang="en-US" dirty="0" smtClean="0"/>
+              <a:t>系列做了</a:t>
+            </a:r>
+            <a:r>
+              <a:rPr kumimoji="1" lang="en-US" altLang="zh-CN" dirty="0" smtClean="0"/>
+              <a:t>backport</a:t>
+            </a:r>
+            <a:r>
+              <a:rPr kumimoji="1" lang="zh-CN" altLang="en-US" dirty="0" smtClean="0"/>
+              <a:t>，</a:t>
+            </a:r>
+            <a:r>
+              <a:rPr kumimoji="1" lang="en-US" altLang="zh-CN" dirty="0" smtClean="0"/>
+              <a:t>RHEL6</a:t>
+            </a:r>
+            <a:r>
+              <a:rPr kumimoji="1" lang="zh-CN" altLang="en-US" dirty="0" smtClean="0"/>
+              <a:t>也可以使用</a:t>
+            </a:r>
+            <a:r>
+              <a:rPr kumimoji="1" lang="en-US" altLang="zh-CN" dirty="0" smtClean="0"/>
+              <a:t>Docker</a:t>
+            </a:r>
+          </a:p>
+          <a:p>
             <a:endParaRPr kumimoji="1" lang="en-US" altLang="zh-CN" dirty="0" smtClean="0"/>
           </a:p>
           <a:p>
-            <a:r>
-              <a:rPr kumimoji="1" lang="en-US" altLang="zh-CN" dirty="0" smtClean="0"/>
-              <a:t>Container</a:t>
-            </a:r>
-            <a:r>
-              <a:rPr kumimoji="1" lang="zh-CN" altLang="en-US" dirty="0" smtClean="0"/>
-              <a:t>挂掉可能会损失数据</a:t>
-            </a:r>
-            <a:endParaRPr kumimoji="1" lang="en-US" altLang="zh-CN" dirty="0" smtClean="0"/>
-          </a:p>
-          <a:p>
-            <a:r>
-              <a:rPr kumimoji="1" lang="en-US" altLang="zh-CN" dirty="0" smtClean="0"/>
-              <a:t>Container</a:t>
-            </a:r>
-            <a:r>
-              <a:rPr kumimoji="1" lang="zh-CN" altLang="en-US" dirty="0" smtClean="0"/>
-              <a:t>挂掉可能会把</a:t>
-            </a:r>
-            <a:r>
-              <a:rPr kumimoji="1" lang="en-US" altLang="zh-CN" dirty="0" smtClean="0"/>
-              <a:t>Host</a:t>
-            </a:r>
-            <a:r>
-              <a:rPr kumimoji="1" lang="zh-CN" altLang="en-US" dirty="0" smtClean="0"/>
-              <a:t>系统带挂</a:t>
-            </a:r>
             <a:endParaRPr kumimoji="1" lang="zh-CN" altLang="en-US" dirty="0"/>
           </a:p>
         </p:txBody>
@@ -6461,7 +6345,7 @@
     </p:spTree>
     <p:extLst>
       <p:ext uri="{BB962C8B-B14F-4D97-AF65-F5344CB8AC3E}">
-        <p14:creationId xmlns:p14="http://schemas.microsoft.com/office/powerpoint/2010/main" val="82265908"/>
+        <p14:creationId xmlns:p14="http://schemas.microsoft.com/office/powerpoint/2010/main" val="927064857"/>
       </p:ext>
     </p:extLst>
   </p:cSld>
@@ -6511,12 +6395,8 @@
           <a:lstStyle/>
           <a:p>
             <a:r>
-              <a:rPr kumimoji="1" lang="zh-CN" altLang="en-US" dirty="0" smtClean="0"/>
-              <a:t>在生产环境使用</a:t>
-            </a:r>
-            <a:r>
               <a:rPr kumimoji="1" lang="en-US" altLang="zh-CN" dirty="0" smtClean="0"/>
-              <a:t>Docker</a:t>
+              <a:t>Storage Driver</a:t>
             </a:r>
             <a:endParaRPr kumimoji="1" lang="zh-CN" altLang="en-US" dirty="0"/>
           </a:p>
@@ -6524,12 +6404,12 @@
       </p:sp>
       <p:sp>
         <p:nvSpPr>
-          <p:cNvPr id="3" name="文本占位符 2"/>
-          <p:cNvSpPr>
-            <a:spLocks noGrp="1"/>
-          </p:cNvSpPr>
-          <p:nvPr>
-            <p:ph type="body" idx="1"/>
+          <p:cNvPr id="3" name="内容占位符 2"/>
+          <p:cNvSpPr>
+            <a:spLocks noGrp="1"/>
+          </p:cNvSpPr>
+          <p:nvPr>
+            <p:ph idx="1"/>
           </p:nvPr>
         </p:nvSpPr>
         <p:spPr/>
@@ -6537,14 +6417,95 @@
           <a:bodyPr/>
           <a:lstStyle/>
           <a:p>
-            <a:endParaRPr kumimoji="1" lang="zh-CN" altLang="en-US"/>
+            <a:r>
+              <a:rPr kumimoji="1" lang="en-US" altLang="zh-CN" dirty="0" smtClean="0"/>
+              <a:t>AUFS</a:t>
+            </a:r>
+            <a:r>
+              <a:rPr kumimoji="1" lang="zh-CN" altLang="en-US" dirty="0" smtClean="0"/>
+              <a:t>不稳定，在</a:t>
+            </a:r>
+            <a:r>
+              <a:rPr kumimoji="1" lang="en-US" altLang="zh-CN" dirty="0" smtClean="0"/>
+              <a:t>3.x</a:t>
+            </a:r>
+            <a:r>
+              <a:rPr kumimoji="1" lang="zh-CN" altLang="en-US" dirty="0" smtClean="0"/>
+              <a:t>内核中经常挂掉，且每个版本症状都不太一样。而</a:t>
+            </a:r>
+            <a:r>
+              <a:rPr kumimoji="1" lang="en-US" altLang="zh-CN" dirty="0" smtClean="0"/>
+              <a:t>4.x</a:t>
+            </a:r>
+            <a:r>
+              <a:rPr kumimoji="1" lang="zh-CN" altLang="en-US" dirty="0" smtClean="0"/>
+              <a:t>内核不再支持</a:t>
+            </a:r>
+            <a:r>
+              <a:rPr kumimoji="1" lang="en-US" altLang="zh-CN" dirty="0" smtClean="0"/>
+              <a:t>AUFS</a:t>
+            </a:r>
+            <a:r>
+              <a:rPr kumimoji="1" lang="zh-CN" altLang="en-US" dirty="0" smtClean="0"/>
+              <a:t>（大写的尴尬</a:t>
+            </a:r>
+            <a:endParaRPr kumimoji="1" lang="en-US" altLang="zh-CN" dirty="0" smtClean="0"/>
+          </a:p>
+          <a:p>
+            <a:r>
+              <a:rPr kumimoji="1" lang="en-US" altLang="zh-CN" dirty="0" err="1" smtClean="0"/>
+              <a:t>OverlayFS</a:t>
+            </a:r>
+            <a:r>
+              <a:rPr kumimoji="1" lang="zh-CN" altLang="en-US" dirty="0" smtClean="0"/>
+              <a:t>夭折</a:t>
+            </a:r>
+            <a:endParaRPr kumimoji="1" lang="en-US" altLang="zh-CN" dirty="0" smtClean="0"/>
+          </a:p>
+          <a:p>
+            <a:r>
+              <a:rPr kumimoji="1" lang="en-US" altLang="zh-CN" dirty="0" smtClean="0"/>
+              <a:t>Overlay2</a:t>
+            </a:r>
+            <a:r>
+              <a:rPr kumimoji="1" lang="zh-CN" altLang="en-US" dirty="0" smtClean="0"/>
+              <a:t>尚不成熟，</a:t>
+            </a:r>
+            <a:r>
+              <a:rPr kumimoji="1" lang="en-US" altLang="zh-CN" dirty="0" smtClean="0"/>
+              <a:t>4.x</a:t>
+            </a:r>
+            <a:r>
+              <a:rPr kumimoji="1" lang="zh-CN" altLang="en-US" dirty="0" smtClean="0"/>
+              <a:t>内核没有广泛使用</a:t>
+            </a:r>
+            <a:endParaRPr kumimoji="1" lang="en-US" altLang="zh-CN" dirty="0" smtClean="0"/>
+          </a:p>
+          <a:p>
+            <a:r>
+              <a:rPr kumimoji="1" lang="zh-CN" altLang="en-US" dirty="0" smtClean="0"/>
+              <a:t>挑选存储驱动很纠结，官方建议</a:t>
+            </a:r>
+            <a:r>
+              <a:rPr kumimoji="1" lang="zh-CN" altLang="en-US" dirty="0" smtClean="0">
+                <a:hlinkClick r:id="rId2"/>
+              </a:rPr>
+              <a:t>查表</a:t>
+            </a:r>
+            <a:endParaRPr kumimoji="1" lang="en-US" altLang="zh-CN" dirty="0" smtClean="0"/>
+          </a:p>
+          <a:p>
+            <a:endParaRPr kumimoji="1" lang="en-US" altLang="zh-CN" dirty="0" smtClean="0"/>
+          </a:p>
+          <a:p>
+            <a:endParaRPr kumimoji="1" lang="zh-CN" altLang="en-US" dirty="0"/>
           </a:p>
         </p:txBody>
       </p:sp>
     </p:spTree>
     <p:extLst>
       <p:ext uri="{BB962C8B-B14F-4D97-AF65-F5344CB8AC3E}">
-        <p14:creationId xmlns:p14="http://schemas.microsoft.com/office/powerpoint/2010/main" val="1566573868"/>
+        <p14:creationId xmlns:p14="http://schemas.microsoft.com/office/powerpoint/2010/main" val="641855112"/>
       </p:ext>
     </p:extLst>
   </p:cSld>
@@ -6595,7 +6556,7 @@
           <a:p>
             <a:r>
               <a:rPr kumimoji="1" lang="zh-CN" altLang="en-US" dirty="0" smtClean="0"/>
-              <a:t>禁忌</a:t>
+              <a:t>反复改名</a:t>
             </a:r>
             <a:endParaRPr kumimoji="1" lang="zh-CN" altLang="en-US" dirty="0"/>
           </a:p>
@@ -6617,8 +6578,171 @@
           <a:lstStyle/>
           <a:p>
             <a:r>
-              <a:rPr kumimoji="1" lang="zh-CN" altLang="en-US" dirty="0" smtClean="0"/>
-              <a:t>在</a:t>
+              <a:rPr kumimoji="1" lang="en-US" altLang="zh-CN" dirty="0" smtClean="0"/>
+              <a:t>2015</a:t>
+            </a:r>
+            <a:r>
+              <a:rPr kumimoji="1" lang="zh-CN" altLang="en-US" dirty="0" smtClean="0"/>
+              <a:t>年，</a:t>
+            </a:r>
+            <a:r>
+              <a:rPr kumimoji="1" lang="en-US" altLang="zh-CN" dirty="0" err="1" smtClean="0"/>
+              <a:t>docker.io</a:t>
+            </a:r>
+            <a:r>
+              <a:rPr kumimoji="1" lang="en-US" altLang="zh-CN" dirty="0" smtClean="0"/>
+              <a:t> </a:t>
+            </a:r>
+            <a:r>
+              <a:rPr kumimoji="1" lang="zh-CN" altLang="en-US" dirty="0" smtClean="0"/>
+              <a:t>改名</a:t>
+            </a:r>
+            <a:r>
+              <a:rPr kumimoji="1" lang="en-US" altLang="zh-CN" dirty="0" smtClean="0"/>
+              <a:t> </a:t>
+            </a:r>
+            <a:r>
+              <a:rPr kumimoji="1" lang="en-US" altLang="zh-CN" dirty="0" err="1" smtClean="0"/>
+              <a:t>docker</a:t>
+            </a:r>
+            <a:r>
+              <a:rPr kumimoji="1" lang="en-US" altLang="zh-CN" dirty="0" smtClean="0"/>
+              <a:t>-engine,</a:t>
+            </a:r>
+            <a:r>
+              <a:rPr kumimoji="1" lang="zh-CN" altLang="en-US" dirty="0" smtClean="0"/>
+              <a:t>从</a:t>
+            </a:r>
+            <a:r>
+              <a:rPr kumimoji="1" lang="en-US" altLang="zh-CN" dirty="0" err="1" smtClean="0"/>
+              <a:t>Debian</a:t>
+            </a:r>
+            <a:r>
+              <a:rPr kumimoji="1" lang="zh-CN" altLang="en-US" dirty="0" smtClean="0"/>
+              <a:t>官方源中移除（然后自己搭了一套）</a:t>
+            </a:r>
+            <a:endParaRPr kumimoji="1" lang="en-US" altLang="zh-CN" dirty="0" smtClean="0"/>
+          </a:p>
+          <a:p>
+            <a:r>
+              <a:rPr kumimoji="1" lang="en-US" altLang="zh-CN" dirty="0" smtClean="0"/>
+              <a:t>2017</a:t>
+            </a:r>
+            <a:r>
+              <a:rPr kumimoji="1" lang="zh-CN" altLang="en-US" dirty="0" smtClean="0"/>
+              <a:t>年</a:t>
+            </a:r>
+            <a:r>
+              <a:rPr kumimoji="1" lang="en-US" altLang="zh-CN" dirty="0" smtClean="0"/>
+              <a:t>2</a:t>
+            </a:r>
+            <a:r>
+              <a:rPr kumimoji="1" lang="zh-CN" altLang="en-US" dirty="0" smtClean="0"/>
+              <a:t>月，</a:t>
+            </a:r>
+            <a:r>
+              <a:rPr kumimoji="1" lang="en-US" altLang="zh-CN" dirty="0" err="1" smtClean="0"/>
+              <a:t>docker</a:t>
+            </a:r>
+            <a:r>
+              <a:rPr kumimoji="1" lang="en-US" altLang="zh-CN" dirty="0" smtClean="0"/>
+              <a:t>-engine</a:t>
+            </a:r>
+            <a:r>
+              <a:rPr kumimoji="1" lang="zh-CN" altLang="en-US" dirty="0" smtClean="0"/>
+              <a:t>改名</a:t>
+            </a:r>
+            <a:r>
+              <a:rPr kumimoji="1" lang="en-US" altLang="zh-CN" dirty="0" err="1" smtClean="0"/>
+              <a:t>docker-ce</a:t>
+            </a:r>
+            <a:r>
+              <a:rPr kumimoji="1" lang="zh-CN" altLang="en-US" dirty="0" smtClean="0"/>
+              <a:t>，目前还处于两个名字都可以用的状态</a:t>
+            </a:r>
+            <a:endParaRPr kumimoji="1" lang="zh-CN" altLang="en-US" dirty="0"/>
+          </a:p>
+        </p:txBody>
+      </p:sp>
+    </p:spTree>
+    <p:extLst>
+      <p:ext uri="{BB962C8B-B14F-4D97-AF65-F5344CB8AC3E}">
+        <p14:creationId xmlns:p14="http://schemas.microsoft.com/office/powerpoint/2010/main" val="60597055"/>
+      </p:ext>
+    </p:extLst>
+  </p:cSld>
+  <p:clrMapOvr>
+    <a:masterClrMapping/>
+  </p:clrMapOvr>
+</p:sld>
+</file>
+
+<file path=ppt/slides/slide24.xml><?xml version="1.0" encoding="utf-8"?>
+<p:sld xmlns:a="http://schemas.openxmlformats.org/drawingml/2006/main" xmlns:r="http://schemas.openxmlformats.org/officeDocument/2006/relationships" xmlns:p="http://schemas.openxmlformats.org/presentationml/2006/main">
+  <p:cSld>
+    <p:spTree>
+      <p:nvGrpSpPr>
+        <p:cNvPr id="1" name=""/>
+        <p:cNvGrpSpPr/>
+        <p:nvPr/>
+      </p:nvGrpSpPr>
+      <p:grpSpPr>
+        <a:xfrm>
+          <a:off x="0" y="0"/>
+          <a:ext cx="0" cy="0"/>
+          <a:chOff x="0" y="0"/>
+          <a:chExt cx="0" cy="0"/>
+        </a:xfrm>
+      </p:grpSpPr>
+      <p:sp>
+        <p:nvSpPr>
+          <p:cNvPr id="2" name="标题 1"/>
+          <p:cNvSpPr>
+            <a:spLocks noGrp="1"/>
+          </p:cNvSpPr>
+          <p:nvPr>
+            <p:ph type="title"/>
+          </p:nvPr>
+        </p:nvSpPr>
+        <p:spPr/>
+        <p:txBody>
+          <a:bodyPr/>
+          <a:lstStyle/>
+          <a:p>
+            <a:r>
+              <a:rPr kumimoji="1" lang="en-US" altLang="zh-CN" dirty="0" smtClean="0"/>
+              <a:t>Release</a:t>
+            </a:r>
+            <a:r>
+              <a:rPr kumimoji="1" lang="zh-CN" altLang="en-US" dirty="0" smtClean="0"/>
+              <a:t> </a:t>
+            </a:r>
+            <a:r>
+              <a:rPr kumimoji="1" lang="en-US" altLang="zh-CN" dirty="0" smtClean="0"/>
+              <a:t>Cycle</a:t>
+            </a:r>
+            <a:endParaRPr kumimoji="1" lang="zh-CN" altLang="en-US" dirty="0"/>
+          </a:p>
+        </p:txBody>
+      </p:sp>
+      <p:sp>
+        <p:nvSpPr>
+          <p:cNvPr id="3" name="内容占位符 2"/>
+          <p:cNvSpPr>
+            <a:spLocks noGrp="1"/>
+          </p:cNvSpPr>
+          <p:nvPr>
+            <p:ph idx="1"/>
+          </p:nvPr>
+        </p:nvSpPr>
+        <p:spPr/>
+        <p:txBody>
+          <a:bodyPr/>
+          <a:lstStyle/>
+          <a:p>
+            <a:r>
+              <a:rPr kumimoji="1" lang="zh-CN" altLang="en-US" dirty="0" smtClean="0"/>
+              <a:t>早期</a:t>
             </a:r>
             <a:r>
               <a:rPr kumimoji="1" lang="en-US" altLang="zh-CN" dirty="0" smtClean="0"/>
@@ -6626,19 +6750,372 @@
             </a:r>
             <a:r>
               <a:rPr kumimoji="1" lang="zh-CN" altLang="en-US" dirty="0" smtClean="0"/>
-              <a:t>中存储数据，包括使用数据卷</a:t>
+              <a:t>迭代迅速，没有</a:t>
+            </a:r>
+            <a:r>
+              <a:rPr kumimoji="1" lang="en-US" altLang="zh-CN" dirty="0" smtClean="0"/>
+              <a:t>LTS</a:t>
+            </a:r>
+            <a:r>
+              <a:rPr kumimoji="1" lang="zh-CN" altLang="en-US" dirty="0" smtClean="0"/>
+              <a:t>，单个版本的生命周期很短</a:t>
             </a:r>
             <a:endParaRPr kumimoji="1" lang="en-US" altLang="zh-CN" dirty="0" smtClean="0"/>
           </a:p>
           <a:p>
             <a:r>
-              <a:rPr kumimoji="1" lang="zh-CN" altLang="en-US" dirty="0" smtClean="0"/>
-              <a:t>在</a:t>
+              <a:rPr kumimoji="1" lang="en-US" altLang="zh-CN" dirty="0"/>
+              <a:t>2017</a:t>
+            </a:r>
+            <a:r>
+              <a:rPr kumimoji="1" lang="zh-CN" altLang="en-US" dirty="0"/>
+              <a:t>年</a:t>
+            </a:r>
+            <a:r>
+              <a:rPr kumimoji="1" lang="en-US" altLang="zh-CN" dirty="0"/>
+              <a:t>2</a:t>
+            </a:r>
+            <a:r>
+              <a:rPr kumimoji="1" lang="zh-CN" altLang="en-US" dirty="0"/>
+              <a:t>月，</a:t>
+            </a:r>
+            <a:r>
+              <a:rPr kumimoji="1" lang="en-US" altLang="zh-CN" dirty="0"/>
+              <a:t>Docker</a:t>
+            </a:r>
+            <a:r>
+              <a:rPr kumimoji="1" lang="zh-CN" altLang="en-US" dirty="0"/>
+              <a:t>发布了企业版（</a:t>
+            </a:r>
+            <a:r>
+              <a:rPr kumimoji="1" lang="en-US" altLang="zh-CN" dirty="0">
+                <a:hlinkClick r:id="rId2"/>
+              </a:rPr>
+              <a:t>ANNOUNCING DOCKER ENTERPRISE EDITION</a:t>
+            </a:r>
+            <a:r>
+              <a:rPr kumimoji="1" lang="zh-CN" altLang="en-US" dirty="0" smtClean="0"/>
+              <a:t>）</a:t>
+            </a:r>
+            <a:r>
+              <a:rPr kumimoji="1" lang="zh-CN" altLang="en-US" b="1" dirty="0" smtClean="0"/>
+              <a:t>可能</a:t>
+            </a:r>
+            <a:r>
+              <a:rPr kumimoji="1" lang="zh-CN" altLang="en-US" dirty="0" smtClean="0"/>
+              <a:t>会改变</a:t>
+            </a:r>
+            <a:r>
+              <a:rPr kumimoji="1" lang="en-US" altLang="zh-CN" dirty="0" smtClean="0"/>
+              <a:t>Release</a:t>
+            </a:r>
+            <a:r>
+              <a:rPr kumimoji="1" lang="zh-CN" altLang="en-US" dirty="0" smtClean="0"/>
+              <a:t> </a:t>
+            </a:r>
+            <a:r>
+              <a:rPr kumimoji="1" lang="en-US" altLang="zh-CN" dirty="0" smtClean="0"/>
+              <a:t>Cycle</a:t>
+            </a:r>
+            <a:r>
+              <a:rPr kumimoji="1" lang="zh-CN" altLang="en-US" dirty="0" smtClean="0"/>
+              <a:t>混乱的问题</a:t>
+            </a:r>
+            <a:endParaRPr kumimoji="1" lang="zh-CN" altLang="en-US" dirty="0"/>
+          </a:p>
+        </p:txBody>
+      </p:sp>
+    </p:spTree>
+    <p:extLst>
+      <p:ext uri="{BB962C8B-B14F-4D97-AF65-F5344CB8AC3E}">
+        <p14:creationId xmlns:p14="http://schemas.microsoft.com/office/powerpoint/2010/main" val="1341296058"/>
+      </p:ext>
+    </p:extLst>
+  </p:cSld>
+  <p:clrMapOvr>
+    <a:masterClrMapping/>
+  </p:clrMapOvr>
+</p:sld>
+</file>
+
+<file path=ppt/slides/slide25.xml><?xml version="1.0" encoding="utf-8"?>
+<p:sld xmlns:a="http://schemas.openxmlformats.org/drawingml/2006/main" xmlns:r="http://schemas.openxmlformats.org/officeDocument/2006/relationships" xmlns:p="http://schemas.openxmlformats.org/presentationml/2006/main">
+  <p:cSld>
+    <p:spTree>
+      <p:nvGrpSpPr>
+        <p:cNvPr id="1" name=""/>
+        <p:cNvGrpSpPr/>
+        <p:nvPr/>
+      </p:nvGrpSpPr>
+      <p:grpSpPr>
+        <a:xfrm>
+          <a:off x="0" y="0"/>
+          <a:ext cx="0" cy="0"/>
+          <a:chOff x="0" y="0"/>
+          <a:chExt cx="0" cy="0"/>
+        </a:xfrm>
+      </p:grpSpPr>
+      <p:sp>
+        <p:nvSpPr>
+          <p:cNvPr id="2" name="标题 1"/>
+          <p:cNvSpPr>
+            <a:spLocks noGrp="1"/>
+          </p:cNvSpPr>
+          <p:nvPr>
+            <p:ph type="title"/>
+          </p:nvPr>
+        </p:nvSpPr>
+        <p:spPr/>
+        <p:txBody>
+          <a:bodyPr/>
+          <a:lstStyle/>
+          <a:p>
+            <a:r>
+              <a:rPr kumimoji="1" lang="zh-CN" altLang="en-US" dirty="0" smtClean="0"/>
+              <a:t>不稳定</a:t>
+            </a:r>
+            <a:endParaRPr kumimoji="1" lang="zh-CN" altLang="en-US" dirty="0"/>
+          </a:p>
+        </p:txBody>
+      </p:sp>
+      <p:sp>
+        <p:nvSpPr>
+          <p:cNvPr id="3" name="内容占位符 2"/>
+          <p:cNvSpPr>
+            <a:spLocks noGrp="1"/>
+          </p:cNvSpPr>
+          <p:nvPr>
+            <p:ph idx="1"/>
+          </p:nvPr>
+        </p:nvSpPr>
+        <p:spPr/>
+        <p:txBody>
+          <a:bodyPr/>
+          <a:lstStyle/>
+          <a:p>
+            <a:r>
+              <a:rPr kumimoji="1" lang="en-US" altLang="zh-CN" dirty="0" smtClean="0"/>
+              <a:t>Container</a:t>
+            </a:r>
+            <a:r>
+              <a:rPr kumimoji="1" lang="zh-CN" altLang="en-US" dirty="0" smtClean="0"/>
+              <a:t>会挂</a:t>
+            </a:r>
+            <a:endParaRPr kumimoji="1" lang="en-US" altLang="zh-CN" dirty="0" smtClean="0"/>
+          </a:p>
+          <a:p>
+            <a:r>
+              <a:rPr kumimoji="1" lang="en-US" altLang="zh-CN" dirty="0" smtClean="0"/>
+              <a:t>Container</a:t>
+            </a:r>
+            <a:r>
+              <a:rPr kumimoji="1" lang="zh-CN" altLang="en-US" dirty="0" smtClean="0"/>
+              <a:t>挂掉可能会损失数据</a:t>
+            </a:r>
+            <a:endParaRPr kumimoji="1" lang="en-US" altLang="zh-CN" dirty="0" smtClean="0"/>
+          </a:p>
+          <a:p>
+            <a:r>
+              <a:rPr kumimoji="1" lang="en-US" altLang="zh-CN" dirty="0" smtClean="0"/>
+              <a:t>Container</a:t>
+            </a:r>
+            <a:r>
+              <a:rPr kumimoji="1" lang="zh-CN" altLang="en-US" dirty="0" smtClean="0"/>
+              <a:t>挂掉可能会把</a:t>
+            </a:r>
+            <a:r>
+              <a:rPr kumimoji="1" lang="en-US" altLang="zh-CN" dirty="0" smtClean="0"/>
+              <a:t>Host</a:t>
+            </a:r>
+            <a:r>
+              <a:rPr kumimoji="1" lang="zh-CN" altLang="en-US" dirty="0" smtClean="0"/>
+              <a:t>系统带挂</a:t>
+            </a:r>
+            <a:endParaRPr kumimoji="1" lang="zh-CN" altLang="en-US" dirty="0"/>
+          </a:p>
+        </p:txBody>
+      </p:sp>
+    </p:spTree>
+    <p:extLst>
+      <p:ext uri="{BB962C8B-B14F-4D97-AF65-F5344CB8AC3E}">
+        <p14:creationId xmlns:p14="http://schemas.microsoft.com/office/powerpoint/2010/main" val="82265908"/>
+      </p:ext>
+    </p:extLst>
+  </p:cSld>
+  <p:clrMapOvr>
+    <a:masterClrMapping/>
+  </p:clrMapOvr>
+  <p:timing>
+    <p:tnLst>
+      <p:par>
+        <p:cTn id="1" dur="indefinite" restart="never" nodeType="tmRoot"/>
+      </p:par>
+    </p:tnLst>
+  </p:timing>
+</p:sld>
+</file>
+
+<file path=ppt/slides/slide26.xml><?xml version="1.0" encoding="utf-8"?>
+<p:sld xmlns:a="http://schemas.openxmlformats.org/drawingml/2006/main" xmlns:r="http://schemas.openxmlformats.org/officeDocument/2006/relationships" xmlns:p="http://schemas.openxmlformats.org/presentationml/2006/main">
+  <p:cSld>
+    <p:spTree>
+      <p:nvGrpSpPr>
+        <p:cNvPr id="1" name=""/>
+        <p:cNvGrpSpPr/>
+        <p:nvPr/>
+      </p:nvGrpSpPr>
+      <p:grpSpPr>
+        <a:xfrm>
+          <a:off x="0" y="0"/>
+          <a:ext cx="0" cy="0"/>
+          <a:chOff x="0" y="0"/>
+          <a:chExt cx="0" cy="0"/>
+        </a:xfrm>
+      </p:grpSpPr>
+      <p:sp>
+        <p:nvSpPr>
+          <p:cNvPr id="2" name="标题 1"/>
+          <p:cNvSpPr>
+            <a:spLocks noGrp="1"/>
+          </p:cNvSpPr>
+          <p:nvPr>
+            <p:ph type="title"/>
+          </p:nvPr>
+        </p:nvSpPr>
+        <p:spPr/>
+        <p:txBody>
+          <a:bodyPr/>
+          <a:lstStyle/>
+          <a:p>
+            <a:r>
+              <a:rPr kumimoji="1" lang="zh-CN" altLang="en-US" dirty="0" smtClean="0"/>
+              <a:t>在生产环境使用</a:t>
             </a:r>
             <a:r>
               <a:rPr kumimoji="1" lang="en-US" altLang="zh-CN" dirty="0" smtClean="0"/>
               <a:t>Docker</a:t>
             </a:r>
+            <a:endParaRPr kumimoji="1" lang="zh-CN" altLang="en-US" dirty="0"/>
+          </a:p>
+        </p:txBody>
+      </p:sp>
+      <p:sp>
+        <p:nvSpPr>
+          <p:cNvPr id="3" name="文本占位符 2"/>
+          <p:cNvSpPr>
+            <a:spLocks noGrp="1"/>
+          </p:cNvSpPr>
+          <p:nvPr>
+            <p:ph type="body" idx="1"/>
+          </p:nvPr>
+        </p:nvSpPr>
+        <p:spPr/>
+        <p:txBody>
+          <a:bodyPr/>
+          <a:lstStyle/>
+          <a:p>
+            <a:endParaRPr kumimoji="1" lang="zh-CN" altLang="en-US"/>
+          </a:p>
+        </p:txBody>
+      </p:sp>
+    </p:spTree>
+    <p:extLst>
+      <p:ext uri="{BB962C8B-B14F-4D97-AF65-F5344CB8AC3E}">
+        <p14:creationId xmlns:p14="http://schemas.microsoft.com/office/powerpoint/2010/main" val="1566573868"/>
+      </p:ext>
+    </p:extLst>
+  </p:cSld>
+  <p:clrMapOvr>
+    <a:masterClrMapping/>
+  </p:clrMapOvr>
+  <p:timing>
+    <p:tnLst>
+      <p:par>
+        <p:cTn id="1" dur="indefinite" restart="never" nodeType="tmRoot"/>
+      </p:par>
+    </p:tnLst>
+  </p:timing>
+</p:sld>
+</file>
+
+<file path=ppt/slides/slide27.xml><?xml version="1.0" encoding="utf-8"?>
+<p:sld xmlns:a="http://schemas.openxmlformats.org/drawingml/2006/main" xmlns:r="http://schemas.openxmlformats.org/officeDocument/2006/relationships" xmlns:p="http://schemas.openxmlformats.org/presentationml/2006/main">
+  <p:cSld>
+    <p:spTree>
+      <p:nvGrpSpPr>
+        <p:cNvPr id="1" name=""/>
+        <p:cNvGrpSpPr/>
+        <p:nvPr/>
+      </p:nvGrpSpPr>
+      <p:grpSpPr>
+        <a:xfrm>
+          <a:off x="0" y="0"/>
+          <a:ext cx="0" cy="0"/>
+          <a:chOff x="0" y="0"/>
+          <a:chExt cx="0" cy="0"/>
+        </a:xfrm>
+      </p:grpSpPr>
+      <p:sp>
+        <p:nvSpPr>
+          <p:cNvPr id="2" name="标题 1"/>
+          <p:cNvSpPr>
+            <a:spLocks noGrp="1"/>
+          </p:cNvSpPr>
+          <p:nvPr>
+            <p:ph type="title"/>
+          </p:nvPr>
+        </p:nvSpPr>
+        <p:spPr/>
+        <p:txBody>
+          <a:bodyPr/>
+          <a:lstStyle/>
+          <a:p>
+            <a:r>
+              <a:rPr kumimoji="1" lang="zh-CN" altLang="en-US" dirty="0" smtClean="0"/>
+              <a:t>注意事项</a:t>
+            </a:r>
+            <a:endParaRPr kumimoji="1" lang="zh-CN" altLang="en-US" dirty="0"/>
+          </a:p>
+        </p:txBody>
+      </p:sp>
+      <p:sp>
+        <p:nvSpPr>
+          <p:cNvPr id="3" name="内容占位符 2"/>
+          <p:cNvSpPr>
+            <a:spLocks noGrp="1"/>
+          </p:cNvSpPr>
+          <p:nvPr>
+            <p:ph idx="1"/>
+          </p:nvPr>
+        </p:nvSpPr>
+        <p:spPr/>
+        <p:txBody>
+          <a:bodyPr/>
+          <a:lstStyle/>
+          <a:p>
+            <a:r>
+              <a:rPr kumimoji="1" lang="zh-CN" altLang="en-US" dirty="0" smtClean="0"/>
+              <a:t>避免在</a:t>
+            </a:r>
+            <a:r>
+              <a:rPr kumimoji="1" lang="en-US" altLang="zh-CN" dirty="0" smtClean="0"/>
+              <a:t>Docker</a:t>
+            </a:r>
+            <a:r>
+              <a:rPr kumimoji="1" lang="zh-CN" altLang="en-US" dirty="0" smtClean="0"/>
+              <a:t>中存储数据，包括使用数据卷</a:t>
+            </a:r>
+            <a:endParaRPr kumimoji="1" lang="en-US" altLang="zh-CN" dirty="0" smtClean="0"/>
+          </a:p>
+          <a:p>
+            <a:r>
+              <a:rPr kumimoji="1" lang="zh-CN" altLang="en-US" dirty="0" smtClean="0"/>
+              <a:t>避免在</a:t>
+            </a:r>
+            <a:r>
+              <a:rPr kumimoji="1" lang="en-US" altLang="zh-CN" dirty="0" smtClean="0"/>
+              <a:t>Docker</a:t>
+            </a:r>
             <a:r>
               <a:rPr kumimoji="1" lang="zh-CN" altLang="en-US" dirty="0" smtClean="0"/>
               <a:t>中运行需要保证稳定性的应用（如金融应用）</a:t>
@@ -6648,7 +7125,7 @@
           <a:p>
             <a:r>
               <a:rPr kumimoji="1" lang="zh-CN" altLang="en-US" dirty="0" smtClean="0"/>
-              <a:t>在</a:t>
+              <a:t>避免在</a:t>
             </a:r>
             <a:r>
               <a:rPr kumimoji="1" lang="en-US" altLang="zh-CN" dirty="0" smtClean="0"/>
@@ -6693,7 +7170,7 @@
 </p:sld>
 </file>
 
-<file path=ppt/slides/slide24.xml><?xml version="1.0" encoding="utf-8"?>
+<file path=ppt/slides/slide28.xml><?xml version="1.0" encoding="utf-8"?>
 <p:sld xmlns:a="http://schemas.openxmlformats.org/drawingml/2006/main" xmlns:r="http://schemas.openxmlformats.org/officeDocument/2006/relationships" xmlns:p="http://schemas.openxmlformats.org/presentationml/2006/main">
   <p:cSld>
     <p:spTree>
@@ -8121,7 +8598,7 @@
 </p:sld>
 </file>
 
-<file path=ppt/slides/slide25.xml><?xml version="1.0" encoding="utf-8"?>
+<file path=ppt/slides/slide29.xml><?xml version="1.0" encoding="utf-8"?>
 <p:sld xmlns:a="http://schemas.openxmlformats.org/drawingml/2006/main" xmlns:r="http://schemas.openxmlformats.org/officeDocument/2006/relationships" xmlns:p="http://schemas.openxmlformats.org/presentationml/2006/main">
   <p:cSld>
     <p:spTree>
@@ -9793,7 +10270,7 @@
           <a:p>
             <a:r>
               <a:rPr kumimoji="1" lang="zh-CN" altLang="en-US" dirty="0" smtClean="0"/>
-              <a:t>安装和使用</a:t>
+              <a:t>安装</a:t>
             </a:r>
             <a:endParaRPr kumimoji="1" lang="zh-CN" altLang="en-US" dirty="0"/>
           </a:p>

</xml_diff>